<commit_message>
Updates to section 2, ppt first draft
</commit_message>
<xml_diff>
--- a/Section 2 - Getting DevOps into Development/VCS.pptx
+++ b/Section 2 - Getting DevOps into Development/VCS.pptx
@@ -6,10 +6,22 @@
   </p:sldMasterIdLst>
   <p:sldIdLst>
     <p:sldId id="256" r:id="rId2"/>
-    <p:sldId id="257" r:id="rId3"/>
-    <p:sldId id="258" r:id="rId4"/>
-    <p:sldId id="260" r:id="rId5"/>
-    <p:sldId id="259" r:id="rId6"/>
+    <p:sldId id="261" r:id="rId3"/>
+    <p:sldId id="268" r:id="rId4"/>
+    <p:sldId id="262" r:id="rId5"/>
+    <p:sldId id="269" r:id="rId6"/>
+    <p:sldId id="257" r:id="rId7"/>
+    <p:sldId id="258" r:id="rId8"/>
+    <p:sldId id="260" r:id="rId9"/>
+    <p:sldId id="259" r:id="rId10"/>
+    <p:sldId id="263" r:id="rId11"/>
+    <p:sldId id="270" r:id="rId12"/>
+    <p:sldId id="271" r:id="rId13"/>
+    <p:sldId id="264" r:id="rId14"/>
+    <p:sldId id="266" r:id="rId15"/>
+    <p:sldId id="267" r:id="rId16"/>
+    <p:sldId id="272" r:id="rId17"/>
+    <p:sldId id="273" r:id="rId18"/>
   </p:sldIdLst>
   <p:sldSz cx="12192000" cy="6858000"/>
   <p:notesSz cx="6858000" cy="9144000"/>
@@ -108,6 +120,11 @@
       </a:defRPr>
     </a:lvl9pPr>
   </p:defaultTextStyle>
+  <p:extLst>
+    <p:ext uri="{EFAFB233-063F-42B5-8137-9DF3F51BA10A}">
+      <p15:sldGuideLst xmlns:p15="http://schemas.microsoft.com/office/powerpoint/2012/main"/>
+    </p:ext>
+  </p:extLst>
 </p:presentation>
 </file>
 
@@ -156,7 +173,6 @@
               <a:rPr lang="en-US"/>
               <a:t>Click to edit Master title style</a:t>
             </a:r>
-            <a:endParaRPr lang="en-US"/>
           </a:p>
         </p:txBody>
       </p:sp>
@@ -221,7 +237,6 @@
               <a:rPr lang="en-US"/>
               <a:t>Click to edit Master subtitle style</a:t>
             </a:r>
-            <a:endParaRPr lang="en-US"/>
           </a:p>
         </p:txBody>
       </p:sp>
@@ -242,7 +257,7 @@
           <a:p>
             <a:fld id="{039DA949-75C4-4C85-A1AD-5C84DB14E962}" type="datetimeFigureOut">
               <a:rPr lang="en-US" smtClean="0"/>
-              <a:t>2/23/2017</a:t>
+              <a:t>3/18/2017</a:t>
             </a:fld>
             <a:endParaRPr lang="en-US"/>
           </a:p>
@@ -339,7 +354,6 @@
               <a:rPr lang="en-US"/>
               <a:t>Click to edit Master title style</a:t>
             </a:r>
-            <a:endParaRPr lang="en-US"/>
           </a:p>
         </p:txBody>
       </p:sp>
@@ -391,7 +405,6 @@
               <a:rPr lang="en-US"/>
               <a:t>Fifth level</a:t>
             </a:r>
-            <a:endParaRPr lang="en-US"/>
           </a:p>
         </p:txBody>
       </p:sp>
@@ -412,7 +425,7 @@
           <a:p>
             <a:fld id="{039DA949-75C4-4C85-A1AD-5C84DB14E962}" type="datetimeFigureOut">
               <a:rPr lang="en-US" smtClean="0"/>
-              <a:t>2/23/2017</a:t>
+              <a:t>3/18/2017</a:t>
             </a:fld>
             <a:endParaRPr lang="en-US"/>
           </a:p>
@@ -514,7 +527,6 @@
               <a:rPr lang="en-US"/>
               <a:t>Click to edit Master title style</a:t>
             </a:r>
-            <a:endParaRPr lang="en-US"/>
           </a:p>
         </p:txBody>
       </p:sp>
@@ -571,7 +583,6 @@
               <a:rPr lang="en-US"/>
               <a:t>Fifth level</a:t>
             </a:r>
-            <a:endParaRPr lang="en-US"/>
           </a:p>
         </p:txBody>
       </p:sp>
@@ -592,7 +603,7 @@
           <a:p>
             <a:fld id="{039DA949-75C4-4C85-A1AD-5C84DB14E962}" type="datetimeFigureOut">
               <a:rPr lang="en-US" smtClean="0"/>
-              <a:t>2/23/2017</a:t>
+              <a:t>3/18/2017</a:t>
             </a:fld>
             <a:endParaRPr lang="en-US"/>
           </a:p>
@@ -689,7 +700,6 @@
               <a:rPr lang="en-US"/>
               <a:t>Click to edit Master title style</a:t>
             </a:r>
-            <a:endParaRPr lang="en-US"/>
           </a:p>
         </p:txBody>
       </p:sp>
@@ -741,7 +751,6 @@
               <a:rPr lang="en-US"/>
               <a:t>Fifth level</a:t>
             </a:r>
-            <a:endParaRPr lang="en-US"/>
           </a:p>
         </p:txBody>
       </p:sp>
@@ -762,7 +771,7 @@
           <a:p>
             <a:fld id="{039DA949-75C4-4C85-A1AD-5C84DB14E962}" type="datetimeFigureOut">
               <a:rPr lang="en-US" smtClean="0"/>
-              <a:t>2/23/2017</a:t>
+              <a:t>3/18/2017</a:t>
             </a:fld>
             <a:endParaRPr lang="en-US"/>
           </a:p>
@@ -868,7 +877,6 @@
               <a:rPr lang="en-US"/>
               <a:t>Click to edit Master title style</a:t>
             </a:r>
-            <a:endParaRPr lang="en-US"/>
           </a:p>
         </p:txBody>
       </p:sp>
@@ -1008,7 +1016,7 @@
           <a:p>
             <a:fld id="{039DA949-75C4-4C85-A1AD-5C84DB14E962}" type="datetimeFigureOut">
               <a:rPr lang="en-US" smtClean="0"/>
-              <a:t>2/23/2017</a:t>
+              <a:t>3/18/2017</a:t>
             </a:fld>
             <a:endParaRPr lang="en-US"/>
           </a:p>
@@ -1105,7 +1113,6 @@
               <a:rPr lang="en-US"/>
               <a:t>Click to edit Master title style</a:t>
             </a:r>
-            <a:endParaRPr lang="en-US"/>
           </a:p>
         </p:txBody>
       </p:sp>
@@ -1162,7 +1169,6 @@
               <a:rPr lang="en-US"/>
               <a:t>Fifth level</a:t>
             </a:r>
-            <a:endParaRPr lang="en-US"/>
           </a:p>
         </p:txBody>
       </p:sp>
@@ -1219,7 +1225,6 @@
               <a:rPr lang="en-US"/>
               <a:t>Fifth level</a:t>
             </a:r>
-            <a:endParaRPr lang="en-US"/>
           </a:p>
         </p:txBody>
       </p:sp>
@@ -1240,7 +1245,7 @@
           <a:p>
             <a:fld id="{039DA949-75C4-4C85-A1AD-5C84DB14E962}" type="datetimeFigureOut">
               <a:rPr lang="en-US" smtClean="0"/>
-              <a:t>2/23/2017</a:t>
+              <a:t>3/18/2017</a:t>
             </a:fld>
             <a:endParaRPr lang="en-US"/>
           </a:p>
@@ -1342,7 +1347,6 @@
               <a:rPr lang="en-US"/>
               <a:t>Click to edit Master title style</a:t>
             </a:r>
-            <a:endParaRPr lang="en-US"/>
           </a:p>
         </p:txBody>
       </p:sp>
@@ -1464,7 +1468,6 @@
               <a:rPr lang="en-US"/>
               <a:t>Fifth level</a:t>
             </a:r>
-            <a:endParaRPr lang="en-US"/>
           </a:p>
         </p:txBody>
       </p:sp>
@@ -1586,7 +1589,6 @@
               <a:rPr lang="en-US"/>
               <a:t>Fifth level</a:t>
             </a:r>
-            <a:endParaRPr lang="en-US"/>
           </a:p>
         </p:txBody>
       </p:sp>
@@ -1607,7 +1609,7 @@
           <a:p>
             <a:fld id="{039DA949-75C4-4C85-A1AD-5C84DB14E962}" type="datetimeFigureOut">
               <a:rPr lang="en-US" smtClean="0"/>
-              <a:t>2/23/2017</a:t>
+              <a:t>3/18/2017</a:t>
             </a:fld>
             <a:endParaRPr lang="en-US"/>
           </a:p>
@@ -1704,7 +1706,6 @@
               <a:rPr lang="en-US"/>
               <a:t>Click to edit Master title style</a:t>
             </a:r>
-            <a:endParaRPr lang="en-US"/>
           </a:p>
         </p:txBody>
       </p:sp>
@@ -1725,7 +1726,7 @@
           <a:p>
             <a:fld id="{039DA949-75C4-4C85-A1AD-5C84DB14E962}" type="datetimeFigureOut">
               <a:rPr lang="en-US" smtClean="0"/>
-              <a:t>2/23/2017</a:t>
+              <a:t>3/18/2017</a:t>
             </a:fld>
             <a:endParaRPr lang="en-US"/>
           </a:p>
@@ -1820,7 +1821,7 @@
           <a:p>
             <a:fld id="{039DA949-75C4-4C85-A1AD-5C84DB14E962}" type="datetimeFigureOut">
               <a:rPr lang="en-US" smtClean="0"/>
-              <a:t>2/23/2017</a:t>
+              <a:t>3/18/2017</a:t>
             </a:fld>
             <a:endParaRPr lang="en-US"/>
           </a:p>
@@ -1926,7 +1927,6 @@
               <a:rPr lang="en-US"/>
               <a:t>Click to edit Master title style</a:t>
             </a:r>
-            <a:endParaRPr lang="en-US"/>
           </a:p>
         </p:txBody>
       </p:sp>
@@ -2011,7 +2011,6 @@
               <a:rPr lang="en-US"/>
               <a:t>Fifth level</a:t>
             </a:r>
-            <a:endParaRPr lang="en-US"/>
           </a:p>
         </p:txBody>
       </p:sp>
@@ -2097,7 +2096,7 @@
           <a:p>
             <a:fld id="{039DA949-75C4-4C85-A1AD-5C84DB14E962}" type="datetimeFigureOut">
               <a:rPr lang="en-US" smtClean="0"/>
-              <a:t>2/23/2017</a:t>
+              <a:t>3/18/2017</a:t>
             </a:fld>
             <a:endParaRPr lang="en-US"/>
           </a:p>
@@ -2203,7 +2202,6 @@
               <a:rPr lang="en-US"/>
               <a:t>Click to edit Master title style</a:t>
             </a:r>
-            <a:endParaRPr lang="en-US"/>
           </a:p>
         </p:txBody>
       </p:sp>
@@ -2350,7 +2348,7 @@
           <a:p>
             <a:fld id="{039DA949-75C4-4C85-A1AD-5C84DB14E962}" type="datetimeFigureOut">
               <a:rPr lang="en-US" smtClean="0"/>
-              <a:t>2/23/2017</a:t>
+              <a:t>3/18/2017</a:t>
             </a:fld>
             <a:endParaRPr lang="en-US"/>
           </a:p>
@@ -2462,7 +2460,6 @@
               <a:rPr lang="en-US"/>
               <a:t>Click to edit Master title style</a:t>
             </a:r>
-            <a:endParaRPr lang="en-US"/>
           </a:p>
         </p:txBody>
       </p:sp>
@@ -2524,7 +2521,6 @@
               <a:rPr lang="en-US"/>
               <a:t>Fifth level</a:t>
             </a:r>
-            <a:endParaRPr lang="en-US"/>
           </a:p>
         </p:txBody>
       </p:sp>
@@ -2563,7 +2559,7 @@
           <a:p>
             <a:fld id="{039DA949-75C4-4C85-A1AD-5C84DB14E962}" type="datetimeFigureOut">
               <a:rPr lang="en-US" smtClean="0"/>
-              <a:t>2/23/2017</a:t>
+              <a:t>3/18/2017</a:t>
             </a:fld>
             <a:endParaRPr lang="en-US"/>
           </a:p>
@@ -3003,7 +2999,1171 @@
 </p:sld>
 </file>
 
+<file path=ppt/slides/slide10.xml><?xml version="1.0" encoding="utf-8"?>
+<p:sld xmlns:a="http://schemas.openxmlformats.org/drawingml/2006/main" xmlns:r="http://schemas.openxmlformats.org/officeDocument/2006/relationships" xmlns:p="http://schemas.openxmlformats.org/presentationml/2006/main">
+  <p:cSld>
+    <p:spTree>
+      <p:nvGrpSpPr>
+        <p:cNvPr id="1" name=""/>
+        <p:cNvGrpSpPr/>
+        <p:nvPr/>
+      </p:nvGrpSpPr>
+      <p:grpSpPr>
+        <a:xfrm>
+          <a:off x="0" y="0"/>
+          <a:ext cx="0" cy="0"/>
+          <a:chOff x="0" y="0"/>
+          <a:chExt cx="0" cy="0"/>
+        </a:xfrm>
+      </p:grpSpPr>
+      <p:sp>
+        <p:nvSpPr>
+          <p:cNvPr id="4" name="Title 3"/>
+          <p:cNvSpPr>
+            <a:spLocks noGrp="1"/>
+          </p:cNvSpPr>
+          <p:nvPr>
+            <p:ph type="ctrTitle"/>
+          </p:nvPr>
+        </p:nvSpPr>
+        <p:spPr/>
+        <p:txBody>
+          <a:bodyPr/>
+          <a:lstStyle/>
+          <a:p>
+            <a:r>
+              <a:rPr lang="en-US" dirty="0"/>
+              <a:t>2.3 – What is CI?</a:t>
+            </a:r>
+          </a:p>
+        </p:txBody>
+      </p:sp>
+    </p:spTree>
+    <p:extLst>
+      <p:ext uri="{BB962C8B-B14F-4D97-AF65-F5344CB8AC3E}">
+        <p14:creationId xmlns:p14="http://schemas.microsoft.com/office/powerpoint/2010/main" val="3810315797"/>
+      </p:ext>
+    </p:extLst>
+  </p:cSld>
+  <p:clrMapOvr>
+    <a:masterClrMapping/>
+  </p:clrMapOvr>
+</p:sld>
+</file>
+
+<file path=ppt/slides/slide11.xml><?xml version="1.0" encoding="utf-8"?>
+<p:sld xmlns:a="http://schemas.openxmlformats.org/drawingml/2006/main" xmlns:r="http://schemas.openxmlformats.org/officeDocument/2006/relationships" xmlns:p="http://schemas.openxmlformats.org/presentationml/2006/main">
+  <p:cSld>
+    <p:spTree>
+      <p:nvGrpSpPr>
+        <p:cNvPr id="1" name=""/>
+        <p:cNvGrpSpPr/>
+        <p:nvPr/>
+      </p:nvGrpSpPr>
+      <p:grpSpPr>
+        <a:xfrm>
+          <a:off x="0" y="0"/>
+          <a:ext cx="0" cy="0"/>
+          <a:chOff x="0" y="0"/>
+          <a:chExt cx="0" cy="0"/>
+        </a:xfrm>
+      </p:grpSpPr>
+      <p:sp>
+        <p:nvSpPr>
+          <p:cNvPr id="2" name="Title 1"/>
+          <p:cNvSpPr>
+            <a:spLocks noGrp="1"/>
+          </p:cNvSpPr>
+          <p:nvPr>
+            <p:ph type="title"/>
+          </p:nvPr>
+        </p:nvSpPr>
+        <p:spPr/>
+        <p:txBody>
+          <a:bodyPr/>
+          <a:lstStyle/>
+          <a:p>
+            <a:r>
+              <a:rPr lang="en-US" dirty="0"/>
+              <a:t>What is Database Continuous Integration</a:t>
+            </a:r>
+          </a:p>
+        </p:txBody>
+      </p:sp>
+      <p:sp>
+        <p:nvSpPr>
+          <p:cNvPr id="3" name="Content Placeholder 2"/>
+          <p:cNvSpPr>
+            <a:spLocks noGrp="1"/>
+          </p:cNvSpPr>
+          <p:nvPr>
+            <p:ph idx="1"/>
+          </p:nvPr>
+        </p:nvSpPr>
+        <p:spPr/>
+        <p:txBody>
+          <a:bodyPr>
+            <a:normAutofit/>
+          </a:bodyPr>
+          <a:lstStyle/>
+          <a:p>
+            <a:r>
+              <a:rPr lang="en-US" dirty="0"/>
+              <a:t>Continuous </a:t>
+            </a:r>
+            <a:r>
+              <a:rPr lang="en-US" dirty="0" err="1"/>
+              <a:t>Integation</a:t>
+            </a:r>
+            <a:r>
+              <a:rPr lang="en-US" dirty="0"/>
+              <a:t> (CI) typically involves</a:t>
+            </a:r>
+          </a:p>
+          <a:p>
+            <a:pPr lvl="1"/>
+            <a:r>
+              <a:rPr lang="en-US" dirty="0"/>
+              <a:t>Trigger based on a commit to source control</a:t>
+            </a:r>
+          </a:p>
+          <a:p>
+            <a:pPr lvl="1"/>
+            <a:r>
+              <a:rPr lang="en-US" dirty="0"/>
+              <a:t>Automatically compiling all code (build)</a:t>
+            </a:r>
+          </a:p>
+          <a:p>
+            <a:pPr lvl="1"/>
+            <a:r>
+              <a:rPr lang="en-US" dirty="0"/>
+              <a:t>Executing automated tests</a:t>
+            </a:r>
+          </a:p>
+          <a:p>
+            <a:pPr lvl="1"/>
+            <a:r>
+              <a:rPr lang="en-US" dirty="0"/>
+              <a:t>Publish a release candidate of the compiled code.</a:t>
+            </a:r>
+          </a:p>
+          <a:p>
+            <a:pPr lvl="1"/>
+            <a:endParaRPr lang="en-US" dirty="0"/>
+          </a:p>
+        </p:txBody>
+      </p:sp>
+    </p:spTree>
+    <p:extLst>
+      <p:ext uri="{BB962C8B-B14F-4D97-AF65-F5344CB8AC3E}">
+        <p14:creationId xmlns:p14="http://schemas.microsoft.com/office/powerpoint/2010/main" val="825335966"/>
+      </p:ext>
+    </p:extLst>
+  </p:cSld>
+  <p:clrMapOvr>
+    <a:masterClrMapping/>
+  </p:clrMapOvr>
+</p:sld>
+</file>
+
+<file path=ppt/slides/slide12.xml><?xml version="1.0" encoding="utf-8"?>
+<p:sld xmlns:a="http://schemas.openxmlformats.org/drawingml/2006/main" xmlns:r="http://schemas.openxmlformats.org/officeDocument/2006/relationships" xmlns:p="http://schemas.openxmlformats.org/presentationml/2006/main">
+  <p:cSld>
+    <p:spTree>
+      <p:nvGrpSpPr>
+        <p:cNvPr id="1" name=""/>
+        <p:cNvGrpSpPr/>
+        <p:nvPr/>
+      </p:nvGrpSpPr>
+      <p:grpSpPr>
+        <a:xfrm>
+          <a:off x="0" y="0"/>
+          <a:ext cx="0" cy="0"/>
+          <a:chOff x="0" y="0"/>
+          <a:chExt cx="0" cy="0"/>
+        </a:xfrm>
+      </p:grpSpPr>
+      <p:sp>
+        <p:nvSpPr>
+          <p:cNvPr id="2" name="Title 1"/>
+          <p:cNvSpPr>
+            <a:spLocks noGrp="1"/>
+          </p:cNvSpPr>
+          <p:nvPr>
+            <p:ph type="title"/>
+          </p:nvPr>
+        </p:nvSpPr>
+        <p:spPr/>
+        <p:txBody>
+          <a:bodyPr/>
+          <a:lstStyle/>
+          <a:p>
+            <a:r>
+              <a:rPr lang="en-US" dirty="0"/>
+              <a:t>What is Database Continuous Integration</a:t>
+            </a:r>
+          </a:p>
+        </p:txBody>
+      </p:sp>
+      <p:sp>
+        <p:nvSpPr>
+          <p:cNvPr id="3" name="Content Placeholder 2"/>
+          <p:cNvSpPr>
+            <a:spLocks noGrp="1"/>
+          </p:cNvSpPr>
+          <p:nvPr>
+            <p:ph idx="1"/>
+          </p:nvPr>
+        </p:nvSpPr>
+        <p:spPr/>
+        <p:txBody>
+          <a:bodyPr>
+            <a:normAutofit/>
+          </a:bodyPr>
+          <a:lstStyle/>
+          <a:p>
+            <a:r>
+              <a:rPr lang="en-US" dirty="0"/>
+              <a:t>For state based database development</a:t>
+            </a:r>
+          </a:p>
+          <a:p>
+            <a:pPr lvl="1"/>
+            <a:r>
+              <a:rPr lang="en-US" dirty="0"/>
+              <a:t>Trigger based on code commit to source control</a:t>
+            </a:r>
+          </a:p>
+          <a:p>
+            <a:pPr lvl="1"/>
+            <a:r>
+              <a:rPr lang="en-US" dirty="0"/>
+              <a:t>Recompile all code on a database (build)</a:t>
+            </a:r>
+          </a:p>
+          <a:p>
+            <a:pPr lvl="1"/>
+            <a:r>
+              <a:rPr lang="en-US" dirty="0"/>
+              <a:t>Run automated tests</a:t>
+            </a:r>
+          </a:p>
+          <a:p>
+            <a:pPr lvl="1"/>
+            <a:r>
+              <a:rPr lang="en-US" dirty="0"/>
+              <a:t>Publish a package containing the current versions of all code</a:t>
+            </a:r>
+          </a:p>
+          <a:p>
+            <a:r>
+              <a:rPr lang="en-US" dirty="0"/>
+              <a:t>For migration based development</a:t>
+            </a:r>
+          </a:p>
+          <a:p>
+            <a:pPr lvl="1"/>
+            <a:r>
+              <a:rPr lang="en-US" dirty="0"/>
+              <a:t>Run a project build to validate all scripts</a:t>
+            </a:r>
+          </a:p>
+          <a:p>
+            <a:pPr lvl="1"/>
+            <a:r>
+              <a:rPr lang="en-US" dirty="0"/>
+              <a:t>Run automated tests</a:t>
+            </a:r>
+          </a:p>
+          <a:p>
+            <a:pPr lvl="1"/>
+            <a:r>
+              <a:rPr lang="en-US" dirty="0"/>
+              <a:t>Publish a package containing the upgrade scripts needed for the target database (or all migration scripts).</a:t>
+            </a:r>
+          </a:p>
+          <a:p>
+            <a:pPr lvl="1"/>
+            <a:endParaRPr lang="en-US" dirty="0"/>
+          </a:p>
+          <a:p>
+            <a:pPr lvl="1"/>
+            <a:endParaRPr lang="en-US" dirty="0"/>
+          </a:p>
+        </p:txBody>
+      </p:sp>
+    </p:spTree>
+    <p:extLst>
+      <p:ext uri="{BB962C8B-B14F-4D97-AF65-F5344CB8AC3E}">
+        <p14:creationId xmlns:p14="http://schemas.microsoft.com/office/powerpoint/2010/main" val="3456377856"/>
+      </p:ext>
+    </p:extLst>
+  </p:cSld>
+  <p:clrMapOvr>
+    <a:masterClrMapping/>
+  </p:clrMapOvr>
+</p:sld>
+</file>
+
+<file path=ppt/slides/slide13.xml><?xml version="1.0" encoding="utf-8"?>
+<p:sld xmlns:a="http://schemas.openxmlformats.org/drawingml/2006/main" xmlns:r="http://schemas.openxmlformats.org/officeDocument/2006/relationships" xmlns:p="http://schemas.openxmlformats.org/presentationml/2006/main">
+  <p:cSld>
+    <p:spTree>
+      <p:nvGrpSpPr>
+        <p:cNvPr id="1" name=""/>
+        <p:cNvGrpSpPr/>
+        <p:nvPr/>
+      </p:nvGrpSpPr>
+      <p:grpSpPr>
+        <a:xfrm>
+          <a:off x="0" y="0"/>
+          <a:ext cx="0" cy="0"/>
+          <a:chOff x="0" y="0"/>
+          <a:chExt cx="0" cy="0"/>
+        </a:xfrm>
+      </p:grpSpPr>
+      <p:sp>
+        <p:nvSpPr>
+          <p:cNvPr id="4" name="Title 3"/>
+          <p:cNvSpPr>
+            <a:spLocks noGrp="1"/>
+          </p:cNvSpPr>
+          <p:nvPr>
+            <p:ph type="ctrTitle"/>
+          </p:nvPr>
+        </p:nvSpPr>
+        <p:spPr/>
+        <p:txBody>
+          <a:bodyPr/>
+          <a:lstStyle/>
+          <a:p>
+            <a:r>
+              <a:rPr lang="en-US" dirty="0"/>
+              <a:t>2.4 – Continuous Testing</a:t>
+            </a:r>
+          </a:p>
+        </p:txBody>
+      </p:sp>
+    </p:spTree>
+    <p:extLst>
+      <p:ext uri="{BB962C8B-B14F-4D97-AF65-F5344CB8AC3E}">
+        <p14:creationId xmlns:p14="http://schemas.microsoft.com/office/powerpoint/2010/main" val="264652084"/>
+      </p:ext>
+    </p:extLst>
+  </p:cSld>
+  <p:clrMapOvr>
+    <a:masterClrMapping/>
+  </p:clrMapOvr>
+</p:sld>
+</file>
+
+<file path=ppt/slides/slide14.xml><?xml version="1.0" encoding="utf-8"?>
+<p:sld xmlns:a="http://schemas.openxmlformats.org/drawingml/2006/main" xmlns:r="http://schemas.openxmlformats.org/officeDocument/2006/relationships" xmlns:p="http://schemas.openxmlformats.org/presentationml/2006/main">
+  <p:cSld>
+    <p:spTree>
+      <p:nvGrpSpPr>
+        <p:cNvPr id="1" name=""/>
+        <p:cNvGrpSpPr/>
+        <p:nvPr/>
+      </p:nvGrpSpPr>
+      <p:grpSpPr>
+        <a:xfrm>
+          <a:off x="0" y="0"/>
+          <a:ext cx="0" cy="0"/>
+          <a:chOff x="0" y="0"/>
+          <a:chExt cx="0" cy="0"/>
+        </a:xfrm>
+      </p:grpSpPr>
+      <p:sp>
+        <p:nvSpPr>
+          <p:cNvPr id="2" name="Title 1"/>
+          <p:cNvSpPr>
+            <a:spLocks noGrp="1"/>
+          </p:cNvSpPr>
+          <p:nvPr>
+            <p:ph type="title"/>
+          </p:nvPr>
+        </p:nvSpPr>
+        <p:spPr/>
+        <p:txBody>
+          <a:bodyPr/>
+          <a:lstStyle/>
+          <a:p>
+            <a:r>
+              <a:rPr lang="en-US" dirty="0"/>
+              <a:t>Testing in Database Continuous Integration</a:t>
+            </a:r>
+          </a:p>
+        </p:txBody>
+      </p:sp>
+      <p:sp>
+        <p:nvSpPr>
+          <p:cNvPr id="3" name="Content Placeholder 2"/>
+          <p:cNvSpPr>
+            <a:spLocks noGrp="1"/>
+          </p:cNvSpPr>
+          <p:nvPr>
+            <p:ph idx="1"/>
+          </p:nvPr>
+        </p:nvSpPr>
+        <p:spPr/>
+        <p:txBody>
+          <a:bodyPr/>
+          <a:lstStyle/>
+          <a:p>
+            <a:r>
+              <a:rPr lang="en-US" dirty="0"/>
+              <a:t>Standards and Static Code Analysis</a:t>
+            </a:r>
+          </a:p>
+          <a:p>
+            <a:r>
+              <a:rPr lang="en-US" dirty="0"/>
+              <a:t>Unit Tests</a:t>
+            </a:r>
+          </a:p>
+          <a:p>
+            <a:r>
+              <a:rPr lang="en-US" dirty="0"/>
+              <a:t>Functional Testing</a:t>
+            </a:r>
+          </a:p>
+          <a:p>
+            <a:r>
+              <a:rPr lang="en-US" dirty="0"/>
+              <a:t>Performance Testing</a:t>
+            </a:r>
+          </a:p>
+          <a:p>
+            <a:r>
+              <a:rPr lang="en-US" dirty="0"/>
+              <a:t>Security Testing</a:t>
+            </a:r>
+          </a:p>
+        </p:txBody>
+      </p:sp>
+    </p:spTree>
+    <p:extLst>
+      <p:ext uri="{BB962C8B-B14F-4D97-AF65-F5344CB8AC3E}">
+        <p14:creationId xmlns:p14="http://schemas.microsoft.com/office/powerpoint/2010/main" val="575774470"/>
+      </p:ext>
+    </p:extLst>
+  </p:cSld>
+  <p:clrMapOvr>
+    <a:masterClrMapping/>
+  </p:clrMapOvr>
+</p:sld>
+</file>
+
+<file path=ppt/slides/slide15.xml><?xml version="1.0" encoding="utf-8"?>
+<p:sld xmlns:a="http://schemas.openxmlformats.org/drawingml/2006/main" xmlns:r="http://schemas.openxmlformats.org/officeDocument/2006/relationships" xmlns:p="http://schemas.openxmlformats.org/presentationml/2006/main">
+  <p:cSld>
+    <p:spTree>
+      <p:nvGrpSpPr>
+        <p:cNvPr id="1" name=""/>
+        <p:cNvGrpSpPr/>
+        <p:nvPr/>
+      </p:nvGrpSpPr>
+      <p:grpSpPr>
+        <a:xfrm>
+          <a:off x="0" y="0"/>
+          <a:ext cx="0" cy="0"/>
+          <a:chOff x="0" y="0"/>
+          <a:chExt cx="0" cy="0"/>
+        </a:xfrm>
+      </p:grpSpPr>
+      <p:sp>
+        <p:nvSpPr>
+          <p:cNvPr id="2" name="Title 1"/>
+          <p:cNvSpPr>
+            <a:spLocks noGrp="1"/>
+          </p:cNvSpPr>
+          <p:nvPr>
+            <p:ph type="title"/>
+          </p:nvPr>
+        </p:nvSpPr>
+        <p:spPr/>
+        <p:txBody>
+          <a:bodyPr/>
+          <a:lstStyle/>
+          <a:p>
+            <a:r>
+              <a:rPr lang="en-US" dirty="0"/>
+              <a:t>Standards and Static Code Analysis Tests</a:t>
+            </a:r>
+          </a:p>
+        </p:txBody>
+      </p:sp>
+      <p:sp>
+        <p:nvSpPr>
+          <p:cNvPr id="3" name="Content Placeholder 2"/>
+          <p:cNvSpPr>
+            <a:spLocks noGrp="1"/>
+          </p:cNvSpPr>
+          <p:nvPr>
+            <p:ph idx="1"/>
+          </p:nvPr>
+        </p:nvSpPr>
+        <p:spPr/>
+        <p:txBody>
+          <a:bodyPr/>
+          <a:lstStyle/>
+          <a:p>
+            <a:r>
+              <a:rPr lang="en-US" dirty="0"/>
+              <a:t>These are tests to ensure that code is consistent.</a:t>
+            </a:r>
+          </a:p>
+          <a:p>
+            <a:r>
+              <a:rPr lang="en-US" dirty="0"/>
+              <a:t>Can include naming, DRI, index requirements, poor programming patterns and more. </a:t>
+            </a:r>
+          </a:p>
+          <a:p>
+            <a:r>
+              <a:rPr lang="en-US" dirty="0"/>
+              <a:t>Testing Tools</a:t>
+            </a:r>
+          </a:p>
+          <a:p>
+            <a:pPr lvl="1"/>
+            <a:r>
+              <a:rPr lang="en-US" dirty="0"/>
+              <a:t>SQL Cop -  </a:t>
+            </a:r>
+            <a:r>
+              <a:rPr lang="en-US" dirty="0">
+                <a:hlinkClick r:id="rId2"/>
+              </a:rPr>
+              <a:t>http://sqlcop.lessthandot.com/</a:t>
+            </a:r>
+            <a:r>
+              <a:rPr lang="en-US" dirty="0"/>
+              <a:t> </a:t>
+            </a:r>
+          </a:p>
+          <a:p>
+            <a:pPr lvl="1"/>
+            <a:r>
+              <a:rPr lang="en-US" dirty="0"/>
+              <a:t>SQL Code Guard - </a:t>
+            </a:r>
+            <a:r>
+              <a:rPr lang="en-US" dirty="0">
+                <a:hlinkClick r:id="rId3"/>
+              </a:rPr>
+              <a:t>https://sqlcodeguard.com/</a:t>
+            </a:r>
+            <a:endParaRPr lang="en-US" dirty="0"/>
+          </a:p>
+          <a:p>
+            <a:pPr lvl="1"/>
+            <a:r>
+              <a:rPr lang="en-US" dirty="0"/>
+              <a:t>SQL </a:t>
+            </a:r>
+            <a:r>
+              <a:rPr lang="en-US" dirty="0" err="1"/>
+              <a:t>Enlight</a:t>
+            </a:r>
+            <a:r>
+              <a:rPr lang="en-US" dirty="0"/>
+              <a:t> - </a:t>
+            </a:r>
+            <a:r>
+              <a:rPr lang="en-US" dirty="0">
+                <a:hlinkClick r:id="rId4"/>
+              </a:rPr>
+              <a:t>http://www.ubitsoft.com/products/sqlenlight/</a:t>
+            </a:r>
+            <a:r>
+              <a:rPr lang="en-US" dirty="0"/>
+              <a:t> </a:t>
+            </a:r>
+          </a:p>
+        </p:txBody>
+      </p:sp>
+    </p:spTree>
+    <p:extLst>
+      <p:ext uri="{BB962C8B-B14F-4D97-AF65-F5344CB8AC3E}">
+        <p14:creationId xmlns:p14="http://schemas.microsoft.com/office/powerpoint/2010/main" val="3624326952"/>
+      </p:ext>
+    </p:extLst>
+  </p:cSld>
+  <p:clrMapOvr>
+    <a:masterClrMapping/>
+  </p:clrMapOvr>
+</p:sld>
+</file>
+
+<file path=ppt/slides/slide16.xml><?xml version="1.0" encoding="utf-8"?>
+<p:sld xmlns:a="http://schemas.openxmlformats.org/drawingml/2006/main" xmlns:r="http://schemas.openxmlformats.org/officeDocument/2006/relationships" xmlns:p="http://schemas.openxmlformats.org/presentationml/2006/main">
+  <p:cSld>
+    <p:spTree>
+      <p:nvGrpSpPr>
+        <p:cNvPr id="1" name=""/>
+        <p:cNvGrpSpPr/>
+        <p:nvPr/>
+      </p:nvGrpSpPr>
+      <p:grpSpPr>
+        <a:xfrm>
+          <a:off x="0" y="0"/>
+          <a:ext cx="0" cy="0"/>
+          <a:chOff x="0" y="0"/>
+          <a:chExt cx="0" cy="0"/>
+        </a:xfrm>
+      </p:grpSpPr>
+      <p:sp>
+        <p:nvSpPr>
+          <p:cNvPr id="2" name="Title 1"/>
+          <p:cNvSpPr>
+            <a:spLocks noGrp="1"/>
+          </p:cNvSpPr>
+          <p:nvPr>
+            <p:ph type="title"/>
+          </p:nvPr>
+        </p:nvSpPr>
+        <p:spPr/>
+        <p:txBody>
+          <a:bodyPr/>
+          <a:lstStyle/>
+          <a:p>
+            <a:r>
+              <a:rPr lang="en-US" dirty="0"/>
+              <a:t>Unit Tests</a:t>
+            </a:r>
+          </a:p>
+        </p:txBody>
+      </p:sp>
+      <p:sp>
+        <p:nvSpPr>
+          <p:cNvPr id="3" name="Content Placeholder 2"/>
+          <p:cNvSpPr>
+            <a:spLocks noGrp="1"/>
+          </p:cNvSpPr>
+          <p:nvPr>
+            <p:ph idx="1"/>
+          </p:nvPr>
+        </p:nvSpPr>
+        <p:spPr/>
+        <p:txBody>
+          <a:bodyPr/>
+          <a:lstStyle/>
+          <a:p>
+            <a:r>
+              <a:rPr lang="en-US" dirty="0"/>
+              <a:t>Unit tests are designed to test individual sections of code.</a:t>
+            </a:r>
+          </a:p>
+          <a:p>
+            <a:r>
+              <a:rPr lang="en-US" dirty="0"/>
+              <a:t>Test stored procedures, functions, and assemblies in isolation.</a:t>
+            </a:r>
+          </a:p>
+          <a:p>
+            <a:r>
+              <a:rPr lang="en-US" dirty="0"/>
+              <a:t>Data is always consistent in a unit test</a:t>
+            </a:r>
+          </a:p>
+          <a:p>
+            <a:r>
+              <a:rPr lang="en-US" dirty="0"/>
+              <a:t>Tools</a:t>
+            </a:r>
+          </a:p>
+          <a:p>
+            <a:pPr lvl="1"/>
+            <a:r>
+              <a:rPr lang="en-US" dirty="0">
+                <a:hlinkClick r:id="rId2"/>
+              </a:rPr>
+              <a:t>Microsoft Unit Testing</a:t>
+            </a:r>
+            <a:endParaRPr lang="en-US" dirty="0"/>
+          </a:p>
+          <a:p>
+            <a:pPr lvl="1"/>
+            <a:r>
+              <a:rPr lang="en-US" dirty="0" err="1">
+                <a:hlinkClick r:id="rId3" action="ppaction://hlinkfile"/>
+              </a:rPr>
+              <a:t>tSQLt</a:t>
+            </a:r>
+            <a:endParaRPr lang="en-US" dirty="0"/>
+          </a:p>
+        </p:txBody>
+      </p:sp>
+    </p:spTree>
+    <p:extLst>
+      <p:ext uri="{BB962C8B-B14F-4D97-AF65-F5344CB8AC3E}">
+        <p14:creationId xmlns:p14="http://schemas.microsoft.com/office/powerpoint/2010/main" val="3226754207"/>
+      </p:ext>
+    </p:extLst>
+  </p:cSld>
+  <p:clrMapOvr>
+    <a:masterClrMapping/>
+  </p:clrMapOvr>
+</p:sld>
+</file>
+
+<file path=ppt/slides/slide17.xml><?xml version="1.0" encoding="utf-8"?>
+<p:sld xmlns:a="http://schemas.openxmlformats.org/drawingml/2006/main" xmlns:r="http://schemas.openxmlformats.org/officeDocument/2006/relationships" xmlns:p="http://schemas.openxmlformats.org/presentationml/2006/main">
+  <p:cSld>
+    <p:spTree>
+      <p:nvGrpSpPr>
+        <p:cNvPr id="1" name=""/>
+        <p:cNvGrpSpPr/>
+        <p:nvPr/>
+      </p:nvGrpSpPr>
+      <p:grpSpPr>
+        <a:xfrm>
+          <a:off x="0" y="0"/>
+          <a:ext cx="0" cy="0"/>
+          <a:chOff x="0" y="0"/>
+          <a:chExt cx="0" cy="0"/>
+        </a:xfrm>
+      </p:grpSpPr>
+      <p:sp>
+        <p:nvSpPr>
+          <p:cNvPr id="2" name="Title 1"/>
+          <p:cNvSpPr>
+            <a:spLocks noGrp="1"/>
+          </p:cNvSpPr>
+          <p:nvPr>
+            <p:ph type="title"/>
+          </p:nvPr>
+        </p:nvSpPr>
+        <p:spPr/>
+        <p:txBody>
+          <a:bodyPr/>
+          <a:lstStyle/>
+          <a:p>
+            <a:r>
+              <a:rPr lang="en-US" dirty="0"/>
+              <a:t>Other Tests</a:t>
+            </a:r>
+          </a:p>
+        </p:txBody>
+      </p:sp>
+      <p:sp>
+        <p:nvSpPr>
+          <p:cNvPr id="3" name="Content Placeholder 2"/>
+          <p:cNvSpPr>
+            <a:spLocks noGrp="1"/>
+          </p:cNvSpPr>
+          <p:nvPr>
+            <p:ph idx="1"/>
+          </p:nvPr>
+        </p:nvSpPr>
+        <p:spPr/>
+        <p:txBody>
+          <a:bodyPr>
+            <a:normAutofit lnSpcReduction="10000"/>
+          </a:bodyPr>
+          <a:lstStyle/>
+          <a:p>
+            <a:r>
+              <a:rPr lang="en-US" dirty="0"/>
+              <a:t>Functional Tests</a:t>
+            </a:r>
+          </a:p>
+          <a:p>
+            <a:pPr lvl="1"/>
+            <a:r>
+              <a:rPr lang="en-US" dirty="0"/>
+              <a:t>Tests multiple sets of code as one unit, i.e. a stored procedure that calls a function and updates a table.</a:t>
+            </a:r>
+          </a:p>
+          <a:p>
+            <a:pPr lvl="1"/>
+            <a:r>
+              <a:rPr lang="en-US" dirty="0"/>
+              <a:t>May include application code test that affect the database</a:t>
+            </a:r>
+          </a:p>
+          <a:p>
+            <a:r>
+              <a:rPr lang="en-US" dirty="0"/>
+              <a:t>Performance (Load) Tests</a:t>
+            </a:r>
+          </a:p>
+          <a:p>
+            <a:pPr lvl="1"/>
+            <a:r>
+              <a:rPr lang="en-US" dirty="0"/>
+              <a:t>Need production sized (or larger) data sets</a:t>
+            </a:r>
+          </a:p>
+          <a:p>
+            <a:pPr lvl="1"/>
+            <a:r>
+              <a:rPr lang="en-US" dirty="0"/>
+              <a:t>Should simulate a production (or larger) workload</a:t>
+            </a:r>
+          </a:p>
+          <a:p>
+            <a:pPr lvl="1"/>
+            <a:r>
+              <a:rPr lang="en-US" dirty="0"/>
+              <a:t>Maybe run less frequently</a:t>
+            </a:r>
+          </a:p>
+          <a:p>
+            <a:r>
+              <a:rPr lang="en-US" dirty="0"/>
+              <a:t>Security Tests</a:t>
+            </a:r>
+          </a:p>
+          <a:p>
+            <a:pPr lvl="1"/>
+            <a:r>
+              <a:rPr lang="en-US" dirty="0"/>
+              <a:t>Ensure access is limited</a:t>
+            </a:r>
+          </a:p>
+          <a:p>
+            <a:pPr lvl="1"/>
+            <a:r>
+              <a:rPr lang="en-US" dirty="0"/>
+              <a:t>More complex to write when roles are not used </a:t>
+            </a:r>
+            <a:r>
+              <a:rPr lang="en-US"/>
+              <a:t>for assigning rights</a:t>
+            </a:r>
+            <a:endParaRPr lang="en-US" dirty="0"/>
+          </a:p>
+        </p:txBody>
+      </p:sp>
+    </p:spTree>
+    <p:extLst>
+      <p:ext uri="{BB962C8B-B14F-4D97-AF65-F5344CB8AC3E}">
+        <p14:creationId xmlns:p14="http://schemas.microsoft.com/office/powerpoint/2010/main" val="1506542675"/>
+      </p:ext>
+    </p:extLst>
+  </p:cSld>
+  <p:clrMapOvr>
+    <a:masterClrMapping/>
+  </p:clrMapOvr>
+</p:sld>
+</file>
+
 <file path=ppt/slides/slide2.xml><?xml version="1.0" encoding="utf-8"?>
+<p:sld xmlns:a="http://schemas.openxmlformats.org/drawingml/2006/main" xmlns:r="http://schemas.openxmlformats.org/officeDocument/2006/relationships" xmlns:p="http://schemas.openxmlformats.org/presentationml/2006/main">
+  <p:cSld>
+    <p:spTree>
+      <p:nvGrpSpPr>
+        <p:cNvPr id="1" name=""/>
+        <p:cNvGrpSpPr/>
+        <p:nvPr/>
+      </p:nvGrpSpPr>
+      <p:grpSpPr>
+        <a:xfrm>
+          <a:off x="0" y="0"/>
+          <a:ext cx="0" cy="0"/>
+          <a:chOff x="0" y="0"/>
+          <a:chExt cx="0" cy="0"/>
+        </a:xfrm>
+      </p:grpSpPr>
+      <p:sp>
+        <p:nvSpPr>
+          <p:cNvPr id="4" name="Title 3"/>
+          <p:cNvSpPr>
+            <a:spLocks noGrp="1"/>
+          </p:cNvSpPr>
+          <p:nvPr>
+            <p:ph type="ctrTitle"/>
+          </p:nvPr>
+        </p:nvSpPr>
+        <p:spPr/>
+        <p:txBody>
+          <a:bodyPr/>
+          <a:lstStyle/>
+          <a:p>
+            <a:r>
+              <a:rPr lang="en-US" dirty="0"/>
+              <a:t>2.1 – VCS Challenges</a:t>
+            </a:r>
+          </a:p>
+        </p:txBody>
+      </p:sp>
+    </p:spTree>
+    <p:extLst>
+      <p:ext uri="{BB962C8B-B14F-4D97-AF65-F5344CB8AC3E}">
+        <p14:creationId xmlns:p14="http://schemas.microsoft.com/office/powerpoint/2010/main" val="916217393"/>
+      </p:ext>
+    </p:extLst>
+  </p:cSld>
+  <p:clrMapOvr>
+    <a:masterClrMapping/>
+  </p:clrMapOvr>
+</p:sld>
+</file>
+
+<file path=ppt/slides/slide3.xml><?xml version="1.0" encoding="utf-8"?>
+<p:sld xmlns:a="http://schemas.openxmlformats.org/drawingml/2006/main" xmlns:r="http://schemas.openxmlformats.org/officeDocument/2006/relationships" xmlns:p="http://schemas.openxmlformats.org/presentationml/2006/main">
+  <p:cSld>
+    <p:spTree>
+      <p:nvGrpSpPr>
+        <p:cNvPr id="1" name=""/>
+        <p:cNvGrpSpPr/>
+        <p:nvPr/>
+      </p:nvGrpSpPr>
+      <p:grpSpPr>
+        <a:xfrm>
+          <a:off x="0" y="0"/>
+          <a:ext cx="0" cy="0"/>
+          <a:chOff x="0" y="0"/>
+          <a:chExt cx="0" cy="0"/>
+        </a:xfrm>
+      </p:grpSpPr>
+      <p:sp>
+        <p:nvSpPr>
+          <p:cNvPr id="2" name="Title 1"/>
+          <p:cNvSpPr>
+            <a:spLocks noGrp="1"/>
+          </p:cNvSpPr>
+          <p:nvPr>
+            <p:ph type="title"/>
+          </p:nvPr>
+        </p:nvSpPr>
+        <p:spPr/>
+        <p:txBody>
+          <a:bodyPr/>
+          <a:lstStyle/>
+          <a:p>
+            <a:r>
+              <a:rPr lang="en-US" dirty="0"/>
+              <a:t>The Challenges of Database Code</a:t>
+            </a:r>
+          </a:p>
+        </p:txBody>
+      </p:sp>
+      <p:sp>
+        <p:nvSpPr>
+          <p:cNvPr id="3" name="Content Placeholder 2"/>
+          <p:cNvSpPr>
+            <a:spLocks noGrp="1"/>
+          </p:cNvSpPr>
+          <p:nvPr>
+            <p:ph idx="1"/>
+          </p:nvPr>
+        </p:nvSpPr>
+        <p:spPr/>
+        <p:txBody>
+          <a:bodyPr/>
+          <a:lstStyle/>
+          <a:p>
+            <a:r>
+              <a:rPr lang="en-US" dirty="0"/>
+              <a:t>With SQL Server, the code is never in a file</a:t>
+            </a:r>
+          </a:p>
+          <a:p>
+            <a:r>
+              <a:rPr lang="en-US" dirty="0"/>
+              <a:t>Every object is a separate code</a:t>
+            </a:r>
+          </a:p>
+          <a:p>
+            <a:r>
+              <a:rPr lang="en-US" dirty="0"/>
+              <a:t>Lack of tooling</a:t>
+            </a:r>
+          </a:p>
+        </p:txBody>
+      </p:sp>
+    </p:spTree>
+    <p:extLst>
+      <p:ext uri="{BB962C8B-B14F-4D97-AF65-F5344CB8AC3E}">
+        <p14:creationId xmlns:p14="http://schemas.microsoft.com/office/powerpoint/2010/main" val="2111420757"/>
+      </p:ext>
+    </p:extLst>
+  </p:cSld>
+  <p:clrMapOvr>
+    <a:masterClrMapping/>
+  </p:clrMapOvr>
+</p:sld>
+</file>
+
+<file path=ppt/slides/slide4.xml><?xml version="1.0" encoding="utf-8"?>
+<p:sld xmlns:a="http://schemas.openxmlformats.org/drawingml/2006/main" xmlns:r="http://schemas.openxmlformats.org/officeDocument/2006/relationships" xmlns:p="http://schemas.openxmlformats.org/presentationml/2006/main">
+  <p:cSld>
+    <p:spTree>
+      <p:nvGrpSpPr>
+        <p:cNvPr id="1" name=""/>
+        <p:cNvGrpSpPr/>
+        <p:nvPr/>
+      </p:nvGrpSpPr>
+      <p:grpSpPr>
+        <a:xfrm>
+          <a:off x="0" y="0"/>
+          <a:ext cx="0" cy="0"/>
+          <a:chOff x="0" y="0"/>
+          <a:chExt cx="0" cy="0"/>
+        </a:xfrm>
+      </p:grpSpPr>
+      <p:sp>
+        <p:nvSpPr>
+          <p:cNvPr id="4" name="Title 3"/>
+          <p:cNvSpPr>
+            <a:spLocks noGrp="1"/>
+          </p:cNvSpPr>
+          <p:nvPr>
+            <p:ph type="ctrTitle"/>
+          </p:nvPr>
+        </p:nvSpPr>
+        <p:spPr/>
+        <p:txBody>
+          <a:bodyPr/>
+          <a:lstStyle/>
+          <a:p>
+            <a:r>
+              <a:rPr lang="en-US" dirty="0"/>
+              <a:t>2.2 – Get Code in VCS</a:t>
+            </a:r>
+          </a:p>
+        </p:txBody>
+      </p:sp>
+    </p:spTree>
+    <p:extLst>
+      <p:ext uri="{BB962C8B-B14F-4D97-AF65-F5344CB8AC3E}">
+        <p14:creationId xmlns:p14="http://schemas.microsoft.com/office/powerpoint/2010/main" val="3471269148"/>
+      </p:ext>
+    </p:extLst>
+  </p:cSld>
+  <p:clrMapOvr>
+    <a:masterClrMapping/>
+  </p:clrMapOvr>
+</p:sld>
+</file>
+
+<file path=ppt/slides/slide5.xml><?xml version="1.0" encoding="utf-8"?>
+<p:sld xmlns:a="http://schemas.openxmlformats.org/drawingml/2006/main" xmlns:r="http://schemas.openxmlformats.org/officeDocument/2006/relationships" xmlns:p="http://schemas.openxmlformats.org/presentationml/2006/main">
+  <p:cSld>
+    <p:spTree>
+      <p:nvGrpSpPr>
+        <p:cNvPr id="1" name=""/>
+        <p:cNvGrpSpPr/>
+        <p:nvPr/>
+      </p:nvGrpSpPr>
+      <p:grpSpPr>
+        <a:xfrm>
+          <a:off x="0" y="0"/>
+          <a:ext cx="0" cy="0"/>
+          <a:chOff x="0" y="0"/>
+          <a:chExt cx="0" cy="0"/>
+        </a:xfrm>
+      </p:grpSpPr>
+      <p:sp>
+        <p:nvSpPr>
+          <p:cNvPr id="2" name="Title 1"/>
+          <p:cNvSpPr>
+            <a:spLocks noGrp="1"/>
+          </p:cNvSpPr>
+          <p:nvPr>
+            <p:ph type="title"/>
+          </p:nvPr>
+        </p:nvSpPr>
+        <p:spPr/>
+        <p:txBody>
+          <a:bodyPr/>
+          <a:lstStyle/>
+          <a:p>
+            <a:r>
+              <a:rPr lang="en-US" dirty="0"/>
+              <a:t>Manually Tracking Database Code</a:t>
+            </a:r>
+          </a:p>
+        </p:txBody>
+      </p:sp>
+      <p:sp>
+        <p:nvSpPr>
+          <p:cNvPr id="3" name="Content Placeholder 2"/>
+          <p:cNvSpPr>
+            <a:spLocks noGrp="1"/>
+          </p:cNvSpPr>
+          <p:nvPr>
+            <p:ph idx="1"/>
+          </p:nvPr>
+        </p:nvSpPr>
+        <p:spPr/>
+        <p:txBody>
+          <a:bodyPr/>
+          <a:lstStyle/>
+          <a:p>
+            <a:r>
+              <a:rPr lang="en-US" dirty="0"/>
+              <a:t>File | Open, File | Save (manual tracking)</a:t>
+            </a:r>
+          </a:p>
+          <a:p>
+            <a:pPr lvl="1"/>
+            <a:r>
+              <a:rPr lang="en-US" dirty="0"/>
+              <a:t>Cumbersome</a:t>
+            </a:r>
+          </a:p>
+          <a:p>
+            <a:pPr lvl="1"/>
+            <a:r>
+              <a:rPr lang="en-US" dirty="0"/>
+              <a:t>Easy to forget</a:t>
+            </a:r>
+          </a:p>
+          <a:p>
+            <a:r>
+              <a:rPr lang="en-US" dirty="0"/>
+              <a:t>Need a file structure</a:t>
+            </a:r>
+          </a:p>
+          <a:p>
+            <a:pPr lvl="1"/>
+            <a:r>
+              <a:rPr lang="en-US" dirty="0"/>
+              <a:t>All objects in one folder (SSMS default)</a:t>
+            </a:r>
+          </a:p>
+          <a:p>
+            <a:pPr lvl="1"/>
+            <a:r>
+              <a:rPr lang="en-US" dirty="0"/>
+              <a:t>Schema name folder and object type folder</a:t>
+            </a:r>
+          </a:p>
+          <a:p>
+            <a:pPr lvl="1"/>
+            <a:r>
+              <a:rPr lang="en-US" dirty="0"/>
+              <a:t>Object type folders, schema in file name.</a:t>
+            </a:r>
+          </a:p>
+          <a:p>
+            <a:r>
+              <a:rPr lang="en-US" dirty="0"/>
+              <a:t>Number the script files for execution order</a:t>
+            </a:r>
+          </a:p>
+        </p:txBody>
+      </p:sp>
+    </p:spTree>
+    <p:extLst>
+      <p:ext uri="{BB962C8B-B14F-4D97-AF65-F5344CB8AC3E}">
+        <p14:creationId xmlns:p14="http://schemas.microsoft.com/office/powerpoint/2010/main" val="3553976455"/>
+      </p:ext>
+    </p:extLst>
+  </p:cSld>
+  <p:clrMapOvr>
+    <a:masterClrMapping/>
+  </p:clrMapOvr>
+</p:sld>
+</file>
+
+<file path=ppt/slides/slide6.xml><?xml version="1.0" encoding="utf-8"?>
 <p:sld xmlns:a="http://schemas.openxmlformats.org/drawingml/2006/main" xmlns:r="http://schemas.openxmlformats.org/officeDocument/2006/relationships" xmlns:p="http://schemas.openxmlformats.org/presentationml/2006/main">
   <p:cSld>
     <p:spTree>
@@ -3062,7 +4222,7 @@
 </p:sld>
 </file>
 
-<file path=ppt/slides/slide3.xml><?xml version="1.0" encoding="utf-8"?>
+<file path=ppt/slides/slide7.xml><?xml version="1.0" encoding="utf-8"?>
 <p:sld xmlns:a="http://schemas.openxmlformats.org/drawingml/2006/main" xmlns:r="http://schemas.openxmlformats.org/officeDocument/2006/relationships" xmlns:p="http://schemas.openxmlformats.org/presentationml/2006/main">
   <p:cSld>
     <p:spTree>
@@ -3122,7 +4282,7 @@
 </p:sld>
 </file>
 
-<file path=ppt/slides/slide4.xml><?xml version="1.0" encoding="utf-8"?>
+<file path=ppt/slides/slide8.xml><?xml version="1.0" encoding="utf-8"?>
 <p:sld xmlns:a="http://schemas.openxmlformats.org/drawingml/2006/main" xmlns:r="http://schemas.openxmlformats.org/officeDocument/2006/relationships" xmlns:p="http://schemas.openxmlformats.org/presentationml/2006/main">
   <p:cSld>
     <p:spTree>
@@ -3182,7 +4342,7 @@
 </p:sld>
 </file>
 
-<file path=ppt/slides/slide5.xml><?xml version="1.0" encoding="utf-8"?>
+<file path=ppt/slides/slide9.xml><?xml version="1.0" encoding="utf-8"?>
 <p:sld xmlns:a="http://schemas.openxmlformats.org/drawingml/2006/main" xmlns:r="http://schemas.openxmlformats.org/officeDocument/2006/relationships" xmlns:p="http://schemas.openxmlformats.org/presentationml/2006/main">
   <p:cSld>
     <p:spTree>

</xml_diff>

<commit_message>
Updated testing slides to match info in section 3
</commit_message>
<xml_diff>
--- a/Section 2 - Getting DevOps into Development/VCS.pptx
+++ b/Section 2 - Getting DevOps into Development/VCS.pptx
@@ -3829,13 +3829,8 @@
             <a:pPr lvl="1"/>
             <a:r>
               <a:rPr lang="en-US" dirty="0"/>
-              <a:t>More complex to write when roles are not used </a:t>
-            </a:r>
-            <a:r>
-              <a:rPr lang="en-US"/>
-              <a:t>for assigning rights</a:t>
-            </a:r>
-            <a:endParaRPr lang="en-US" dirty="0"/>
+              <a:t>More complex to write when roles are not used for assigning rights</a:t>
+            </a:r>
           </a:p>
         </p:txBody>
       </p:sp>

</xml_diff>